<commit_message>
Added Bio and updated Resume
</commit_message>
<xml_diff>
--- a/docs/FarrukhMirza Bio.pptx
+++ b/docs/FarrukhMirza Bio.pptx
@@ -132,7 +132,7 @@
   </p:defaultTextStyle>
   <p:extLst>
     <p:ext uri="{EFAFB233-063F-42B5-8137-9DF3F51BA10A}">
-      <p15:sldGuideLst xmlns="" xmlns:p15="http://schemas.microsoft.com/office/powerpoint/2012/main">
+      <p15:sldGuideLst xmlns:p15="http://schemas.microsoft.com/office/powerpoint/2012/main" xmlns="">
         <p15:guide id="1" orient="horz" pos="2160">
           <p15:clr>
             <a:srgbClr val="A4A3A4"/>
@@ -239,7 +239,7 @@
           <a:p>
             <a:fld id="{42ADD82B-95D4-419F-A122-D9ED0BC08FFE}" type="datetimeFigureOut">
               <a:rPr lang="en-GB" smtClean="0"/>
-              <a:t>29/01/2020</a:t>
+              <a:t>06/02/2020</a:t>
             </a:fld>
             <a:endParaRPr lang="en-GB" dirty="0"/>
           </a:p>
@@ -20331,7 +20331,7 @@
         </p:nvSpPr>
         <p:spPr bwMode="auto">
           <a:xfrm>
-            <a:off x="115792" y="1844824"/>
+            <a:off x="115792" y="1484784"/>
             <a:ext cx="4356000" cy="252000"/>
           </a:xfrm>
           <a:prstGeom prst="rect">
@@ -20383,8 +20383,8 @@
         </p:nvSpPr>
         <p:spPr bwMode="auto">
           <a:xfrm>
-            <a:off x="101975" y="2132855"/>
-            <a:ext cx="4386244" cy="2304257"/>
+            <a:off x="101975" y="1772815"/>
+            <a:ext cx="4386244" cy="2592289"/>
           </a:xfrm>
           <a:prstGeom prst="rect">
             <a:avLst/>
@@ -20451,7 +20451,7 @@
                 <a:latin typeface="Segoe UI Semibold" panose="020B0702040204020203" pitchFamily="34" charset="0"/>
                 <a:cs typeface="Segoe UI Semibold" panose="020B0702040204020203" pitchFamily="34" charset="0"/>
               </a:rPr>
-              <a:t>Architect, leader </a:t>
+              <a:t>Architect, Manager, </a:t>
             </a:r>
             <a:r>
               <a:rPr lang="en-IE" sz="1000" dirty="0" smtClean="0">
@@ -20461,27 +20461,7 @@
                 <a:latin typeface="Segoe UI Semibold" panose="020B0702040204020203" pitchFamily="34" charset="0"/>
                 <a:cs typeface="Segoe UI Semibold" panose="020B0702040204020203" pitchFamily="34" charset="0"/>
               </a:rPr>
-              <a:t>&amp; software engineering professional with over </a:t>
-            </a:r>
-            <a:r>
-              <a:rPr lang="en-IE" sz="1000" dirty="0" smtClean="0">
-                <a:solidFill>
-                  <a:srgbClr val="FFFFFF"/>
-                </a:solidFill>
-                <a:latin typeface="Segoe UI Semibold" panose="020B0702040204020203" pitchFamily="34" charset="0"/>
-                <a:cs typeface="Segoe UI Semibold" panose="020B0702040204020203" pitchFamily="34" charset="0"/>
-              </a:rPr>
-              <a:t>15 </a:t>
-            </a:r>
-            <a:r>
-              <a:rPr lang="en-IE" sz="1000" dirty="0" smtClean="0">
-                <a:solidFill>
-                  <a:srgbClr val="FFFFFF"/>
-                </a:solidFill>
-                <a:latin typeface="Segoe UI Semibold" panose="020B0702040204020203" pitchFamily="34" charset="0"/>
-                <a:cs typeface="Segoe UI Semibold" panose="020B0702040204020203" pitchFamily="34" charset="0"/>
-              </a:rPr>
-              <a:t>years of experience in a variety of roles including team leadership &amp; management, and hands-on software architecture, design, development  &amp; integration experience.</a:t>
+              <a:t>leader &amp; software engineering professional with over 15 years of experience in a variety of roles including team leadership &amp; management, and hands-on software architecture, design, development  &amp; integration experience.</a:t>
             </a:r>
           </a:p>
           <a:p>
@@ -20526,7 +20506,27 @@
                 <a:latin typeface="Segoe UI Semibold" panose="020B0702040204020203" pitchFamily="34" charset="0"/>
                 <a:cs typeface="Segoe UI Semibold" panose="020B0702040204020203" pitchFamily="34" charset="0"/>
               </a:rPr>
-              <a:t>He has successfully architected, designed  &amp; delivered web applications, highly scalable </a:t>
+              <a:t>Farrukh has successfully built, lead &amp; mentored high efficiency teams by hiring excellent software development professionals and scaling existing team structures. </a:t>
+            </a:r>
+            <a:r>
+              <a:rPr lang="en-IE" sz="1000" dirty="0" smtClean="0">
+                <a:solidFill>
+                  <a:srgbClr val="FFFFFF"/>
+                </a:solidFill>
+                <a:latin typeface="Segoe UI Semibold" panose="020B0702040204020203" pitchFamily="34" charset="0"/>
+                <a:cs typeface="Segoe UI Semibold" panose="020B0702040204020203" pitchFamily="34" charset="0"/>
+              </a:rPr>
+              <a:t>He </a:t>
+            </a:r>
+            <a:r>
+              <a:rPr lang="en-IE" sz="1000" dirty="0" smtClean="0">
+                <a:solidFill>
+                  <a:srgbClr val="FFFFFF"/>
+                </a:solidFill>
+                <a:latin typeface="Segoe UI Semibold" panose="020B0702040204020203" pitchFamily="34" charset="0"/>
+                <a:cs typeface="Segoe UI Semibold" panose="020B0702040204020203" pitchFamily="34" charset="0"/>
+              </a:rPr>
+              <a:t>has successfully architected, designed  &amp; delivered web applications, highly scalable </a:t>
             </a:r>
             <a:r>
               <a:rPr lang="en-IE" sz="1000" dirty="0" err="1" smtClean="0">
@@ -20772,8 +20772,8 @@
         </p:nvSpPr>
         <p:spPr>
           <a:xfrm>
-            <a:off x="1403648" y="43197"/>
-            <a:ext cx="3080900" cy="1384995"/>
+            <a:off x="1259632" y="43197"/>
+            <a:ext cx="3080900" cy="1538883"/>
           </a:xfrm>
           <a:prstGeom prst="rect">
             <a:avLst/>
@@ -20819,7 +20819,17 @@
                 <a:latin typeface="Segoe UI Semibold" panose="020B0702040204020203" pitchFamily="34" charset="0"/>
                 <a:cs typeface="Segoe UI Semibold" panose="020B0702040204020203" pitchFamily="34" charset="0"/>
               </a:rPr>
-              <a:t>Senior Solution Architect</a:t>
+              <a:t>Senior Solution </a:t>
+            </a:r>
+            <a:r>
+              <a:rPr lang="en-GB" sz="1000" i="1" kern="0" dirty="0" smtClean="0">
+                <a:solidFill>
+                  <a:srgbClr val="FFFFFF"/>
+                </a:solidFill>
+                <a:latin typeface="Segoe UI Semibold" panose="020B0702040204020203" pitchFamily="34" charset="0"/>
+                <a:cs typeface="Segoe UI Semibold" panose="020B0702040204020203" pitchFamily="34" charset="0"/>
+              </a:rPr>
+              <a:t>Architect/Manager</a:t>
             </a:r>
             <a:endParaRPr lang="en-GB" sz="1000" i="1" kern="0" dirty="0">
               <a:solidFill>
@@ -20895,7 +20905,7 @@
                 <a:latin typeface="Segoe UI Semibold" panose="020B0702040204020203" pitchFamily="34" charset="0"/>
                 <a:cs typeface="Segoe UI Semibold" panose="020B0702040204020203" pitchFamily="34" charset="0"/>
               </a:rPr>
-              <a:t>087-338 5687</a:t>
+              <a:t>+353-87-2719767</a:t>
             </a:r>
           </a:p>
           <a:p>
@@ -20910,17 +20920,7 @@
                 <a:latin typeface="Segoe UI Semibold" panose="020B0702040204020203" pitchFamily="34" charset="0"/>
                 <a:cs typeface="Segoe UI Semibold" panose="020B0702040204020203" pitchFamily="34" charset="0"/>
               </a:rPr>
-              <a:t>LinkedIn</a:t>
-            </a:r>
-            <a:r>
-              <a:rPr lang="en-GB" sz="1000" kern="0" dirty="0">
-                <a:solidFill>
-                  <a:srgbClr val="FFFFFF"/>
-                </a:solidFill>
-                <a:latin typeface="Segoe UI Semibold" panose="020B0702040204020203" pitchFamily="34" charset="0"/>
-                <a:cs typeface="Segoe UI Semibold" panose="020B0702040204020203" pitchFamily="34" charset="0"/>
-              </a:rPr>
-              <a:t>: </a:t>
+              <a:t>Web: </a:t>
             </a:r>
             <a:r>
               <a:rPr lang="en-GB" sz="1000" kern="0" dirty="0" smtClean="0">
@@ -20931,7 +20931,17 @@
                 <a:cs typeface="Segoe UI Semibold" panose="020B0702040204020203" pitchFamily="34" charset="0"/>
                 <a:hlinkClick r:id="rId2"/>
               </a:rPr>
-              <a:t>www.linkedin.com/in/dr-farrukh-mirza</a:t>
+              <a:t>https://farrukhmpk.github.io</a:t>
+            </a:r>
+            <a:r>
+              <a:rPr lang="en-GB" sz="1000" kern="0" dirty="0" smtClean="0">
+                <a:solidFill>
+                  <a:srgbClr val="FFFFFF"/>
+                </a:solidFill>
+                <a:latin typeface="Segoe UI Semibold" panose="020B0702040204020203" pitchFamily="34" charset="0"/>
+                <a:cs typeface="Segoe UI Semibold" panose="020B0702040204020203" pitchFamily="34" charset="0"/>
+              </a:rPr>
+              <a:t> </a:t>
             </a:r>
             <a:endParaRPr lang="en-GB" sz="1000" kern="0" dirty="0" smtClean="0">
               <a:solidFill>
@@ -20953,7 +20963,7 @@
                 <a:latin typeface="Segoe UI Semibold" panose="020B0702040204020203" pitchFamily="34" charset="0"/>
                 <a:cs typeface="Segoe UI Semibold" panose="020B0702040204020203" pitchFamily="34" charset="0"/>
               </a:rPr>
-              <a:t>GitHub</a:t>
+              <a:t>LinkedIn</a:t>
             </a:r>
             <a:r>
               <a:rPr lang="en-GB" sz="1000" kern="0" dirty="0">
@@ -20966,7 +20976,7 @@
               <a:t>: </a:t>
             </a:r>
             <a:r>
-              <a:rPr lang="en-GB" sz="1000" kern="0" dirty="0">
+              <a:rPr lang="en-GB" sz="1000" kern="0" dirty="0" smtClean="0">
                 <a:solidFill>
                   <a:srgbClr val="FFFFFF"/>
                 </a:solidFill>
@@ -20974,8 +20984,20 @@
                 <a:cs typeface="Segoe UI Semibold" panose="020B0702040204020203" pitchFamily="34" charset="0"/>
                 <a:hlinkClick r:id="rId3"/>
               </a:rPr>
-              <a:t>https://</a:t>
-            </a:r>
+              <a:t>www.linkedin.com/in/dr-farrukh-mirza</a:t>
+            </a:r>
+            <a:endParaRPr lang="en-GB" sz="1000" kern="0" dirty="0" smtClean="0">
+              <a:solidFill>
+                <a:srgbClr val="FFFFFF"/>
+              </a:solidFill>
+              <a:latin typeface="Segoe UI Semibold" panose="020B0702040204020203" pitchFamily="34" charset="0"/>
+              <a:cs typeface="Segoe UI Semibold" panose="020B0702040204020203" pitchFamily="34" charset="0"/>
+            </a:endParaRPr>
+          </a:p>
+          <a:p>
+            <a:pPr>
+              <a:defRPr/>
+            </a:pPr>
             <a:r>
               <a:rPr lang="en-GB" sz="1000" kern="0" dirty="0" smtClean="0">
                 <a:solidFill>
@@ -20983,7 +21005,38 @@
                 </a:solidFill>
                 <a:latin typeface="Segoe UI Semibold" panose="020B0702040204020203" pitchFamily="34" charset="0"/>
                 <a:cs typeface="Segoe UI Semibold" panose="020B0702040204020203" pitchFamily="34" charset="0"/>
-                <a:hlinkClick r:id="rId3"/>
+              </a:rPr>
+              <a:t>GitHub</a:t>
+            </a:r>
+            <a:r>
+              <a:rPr lang="en-GB" sz="1000" kern="0" dirty="0">
+                <a:solidFill>
+                  <a:srgbClr val="FFFFFF"/>
+                </a:solidFill>
+                <a:latin typeface="Segoe UI Semibold" panose="020B0702040204020203" pitchFamily="34" charset="0"/>
+                <a:cs typeface="Segoe UI Semibold" panose="020B0702040204020203" pitchFamily="34" charset="0"/>
+              </a:rPr>
+              <a:t>: </a:t>
+            </a:r>
+            <a:r>
+              <a:rPr lang="en-GB" sz="1000" kern="0" dirty="0">
+                <a:solidFill>
+                  <a:srgbClr val="FFFFFF"/>
+                </a:solidFill>
+                <a:latin typeface="Segoe UI Semibold" panose="020B0702040204020203" pitchFamily="34" charset="0"/>
+                <a:cs typeface="Segoe UI Semibold" panose="020B0702040204020203" pitchFamily="34" charset="0"/>
+                <a:hlinkClick r:id="rId4"/>
+              </a:rPr>
+              <a:t>https://</a:t>
+            </a:r>
+            <a:r>
+              <a:rPr lang="en-GB" sz="1000" kern="0" dirty="0" smtClean="0">
+                <a:solidFill>
+                  <a:srgbClr val="FFFFFF"/>
+                </a:solidFill>
+                <a:latin typeface="Segoe UI Semibold" panose="020B0702040204020203" pitchFamily="34" charset="0"/>
+                <a:cs typeface="Segoe UI Semibold" panose="020B0702040204020203" pitchFamily="34" charset="0"/>
+                <a:hlinkClick r:id="rId4"/>
               </a:rPr>
               <a:t>github.com/farrukhmpk</a:t>
             </a:r>
@@ -21019,7 +21072,7 @@
         </p:nvSpPr>
         <p:spPr bwMode="auto">
           <a:xfrm>
-            <a:off x="101975" y="4473144"/>
+            <a:off x="101975" y="4581128"/>
             <a:ext cx="4356000" cy="252000"/>
           </a:xfrm>
           <a:prstGeom prst="rect">
@@ -21054,8 +21107,23 @@
                 </a:solidFill>
                 <a:latin typeface="Calibri" pitchFamily="34" charset="0"/>
               </a:rPr>
-              <a:t>Selected Professional Skills</a:t>
-            </a:r>
+              <a:t>Selected Professional </a:t>
+            </a:r>
+            <a:r>
+              <a:rPr lang="en-GB" sz="1050" b="1" kern="0" dirty="0" smtClean="0">
+                <a:solidFill>
+                  <a:srgbClr val="FFFFFF"/>
+                </a:solidFill>
+                <a:latin typeface="Calibri" pitchFamily="34" charset="0"/>
+              </a:rPr>
+              <a:t>Skills &amp; Strengths</a:t>
+            </a:r>
+            <a:endParaRPr lang="en-GB" sz="1050" b="1" kern="0" dirty="0">
+              <a:solidFill>
+                <a:srgbClr val="FFFFFF"/>
+              </a:solidFill>
+              <a:latin typeface="Calibri" pitchFamily="34" charset="0"/>
+            </a:endParaRPr>
           </a:p>
         </p:txBody>
       </p:sp>
@@ -21067,7 +21135,7 @@
         </p:nvSpPr>
         <p:spPr>
           <a:xfrm>
-            <a:off x="-36512" y="4797152"/>
+            <a:off x="46147" y="4797152"/>
             <a:ext cx="1838196" cy="369332"/>
           </a:xfrm>
           <a:prstGeom prst="rect">
@@ -21205,8 +21273,8 @@
         </p:nvSpPr>
         <p:spPr>
           <a:xfrm>
-            <a:off x="-36511" y="5157192"/>
-            <a:ext cx="2077580" cy="369332"/>
+            <a:off x="46148" y="5219908"/>
+            <a:ext cx="1555629" cy="369332"/>
           </a:xfrm>
           <a:prstGeom prst="rect">
             <a:avLst/>
@@ -22358,7 +22426,7 @@
         </p:nvSpPr>
         <p:spPr>
           <a:xfrm>
-            <a:off x="-36513" y="5589240"/>
+            <a:off x="46146" y="5589240"/>
             <a:ext cx="1657597" cy="507831"/>
           </a:xfrm>
           <a:prstGeom prst="rect">
@@ -22475,7 +22543,18 @@
                 <a:ea typeface="Segoe UI Black" panose="020B0A02040204020203" pitchFamily="34" charset="0"/>
                 <a:cs typeface="Segoe UI Semibold" panose="020B0702040204020203" pitchFamily="34" charset="0"/>
               </a:rPr>
-              <a:t>Process &amp; Operations Automation, Containers, DevOps &amp; Tooling</a:t>
+              <a:t>Process &amp; Operations Automation, Containers, DevOps &amp; </a:t>
+            </a:r>
+            <a:r>
+              <a:rPr lang="en-GB" sz="900" dirty="0" smtClean="0">
+                <a:solidFill>
+                  <a:srgbClr val="FFFFFF"/>
+                </a:solidFill>
+                <a:latin typeface="Segoe UI Semibold" panose="020B0702040204020203" pitchFamily="34" charset="0"/>
+                <a:ea typeface="Segoe UI Black" panose="020B0A02040204020203" pitchFamily="34" charset="0"/>
+                <a:cs typeface="Segoe UI Semibold" panose="020B0702040204020203" pitchFamily="34" charset="0"/>
+              </a:rPr>
+              <a:t>Tooling, Cloud</a:t>
             </a:r>
             <a:endParaRPr lang="id-ID" sz="900" dirty="0">
               <a:solidFill>
@@ -22496,7 +22575,7 @@
         </p:nvSpPr>
         <p:spPr>
           <a:xfrm>
-            <a:off x="-36512" y="6078488"/>
+            <a:off x="46147" y="6078488"/>
             <a:ext cx="1547504" cy="369332"/>
           </a:xfrm>
           <a:prstGeom prst="rect">
@@ -22634,7 +22713,7 @@
         </p:nvCxnSpPr>
         <p:spPr>
           <a:xfrm>
-            <a:off x="5580112" y="592088"/>
+            <a:off x="5580112" y="664096"/>
             <a:ext cx="0" cy="4133056"/>
           </a:xfrm>
           <a:prstGeom prst="straightConnector1">
@@ -22774,16 +22853,7 @@
                 </a:solidFill>
                 <a:latin typeface="Calibri Light" panose="020F0302020204030204" pitchFamily="34" charset="0"/>
               </a:rPr>
-              <a:t>Solution/System/Software </a:t>
-            </a:r>
-            <a:r>
-              <a:rPr lang="en-GB" sz="1100" dirty="0" smtClean="0">
-                <a:solidFill>
-                  <a:srgbClr val="464646"/>
-                </a:solidFill>
-                <a:latin typeface="Calibri Light" panose="020F0302020204030204" pitchFamily="34" charset="0"/>
-              </a:rPr>
-              <a:t>Architecture</a:t>
+              <a:t>Solution/System/Software Architecture</a:t>
             </a:r>
           </a:p>
           <a:p>
@@ -22832,7 +22902,7 @@
         </p:nvSpPr>
         <p:spPr>
           <a:xfrm>
-            <a:off x="4678127" y="3270176"/>
+            <a:off x="4678127" y="3342184"/>
             <a:ext cx="772969" cy="230832"/>
           </a:xfrm>
           <a:prstGeom prst="rect">
@@ -22881,7 +22951,7 @@
         </p:nvSpPr>
         <p:spPr>
           <a:xfrm>
-            <a:off x="5674428" y="3210361"/>
+            <a:off x="5674428" y="3309264"/>
             <a:ext cx="3362068" cy="938719"/>
           </a:xfrm>
           <a:prstGeom prst="rect">
@@ -22939,23 +23009,8 @@
                 </a:solidFill>
                 <a:latin typeface="Calibri Light" panose="020F0302020204030204" pitchFamily="34" charset="0"/>
               </a:rPr>
-              <a:t>Embedded </a:t>
-            </a:r>
-            <a:r>
-              <a:rPr lang="en-IE" sz="1100" dirty="0" smtClean="0">
-                <a:solidFill>
-                  <a:srgbClr val="464646"/>
-                </a:solidFill>
-                <a:latin typeface="Calibri Light" panose="020F0302020204030204" pitchFamily="34" charset="0"/>
-              </a:rPr>
-              <a:t>Systems &amp; Middleware</a:t>
-            </a:r>
-            <a:endParaRPr lang="en-IE" sz="1100" dirty="0" smtClean="0">
-              <a:solidFill>
-                <a:srgbClr val="464646"/>
-              </a:solidFill>
-              <a:latin typeface="Calibri Light" panose="020F0302020204030204" pitchFamily="34" charset="0"/>
-            </a:endParaRPr>
+              <a:t>Embedded Systems &amp; Middleware</a:t>
+            </a:r>
           </a:p>
           <a:p>
             <a:pPr marL="128622" indent="-128622" defTabSz="455912">
@@ -23125,23 +23180,7 @@
                   <a:srgbClr val="464646"/>
                 </a:solidFill>
               </a:rPr>
-              <a:t>Doctor of </a:t>
-            </a:r>
-            <a:r>
-              <a:rPr lang="en-IE" sz="1000" b="1" dirty="0" smtClean="0">
-                <a:solidFill>
-                  <a:srgbClr val="464646"/>
-                </a:solidFill>
-              </a:rPr>
-              <a:t>Philosophy (PhD), </a:t>
-            </a:r>
-            <a:r>
-              <a:rPr lang="en-IE" sz="1000" b="1" dirty="0" smtClean="0">
-                <a:solidFill>
-                  <a:srgbClr val="464646"/>
-                </a:solidFill>
-              </a:rPr>
-              <a:t>Computer Science, Trinity College Dublin</a:t>
+              <a:t>Doctor of Philosophy (PhD), Computer Science, Trinity College Dublin</a:t>
             </a:r>
             <a:endParaRPr lang="en-GB" sz="1000" b="1" dirty="0">
               <a:solidFill>
@@ -23163,23 +23202,7 @@
                   <a:srgbClr val="464646"/>
                 </a:solidFill>
               </a:rPr>
-              <a:t>Postgraduate </a:t>
-            </a:r>
-            <a:r>
-              <a:rPr lang="en-US" sz="1000" b="1" dirty="0" smtClean="0">
-                <a:solidFill>
-                  <a:srgbClr val="464646"/>
-                </a:solidFill>
-              </a:rPr>
-              <a:t>Diploma (PGD) </a:t>
-            </a:r>
-            <a:r>
-              <a:rPr lang="en-US" sz="1000" b="1" dirty="0" smtClean="0">
-                <a:solidFill>
-                  <a:srgbClr val="464646"/>
-                </a:solidFill>
-              </a:rPr>
-              <a:t>in Statistics, Trinity College Dublin</a:t>
+              <a:t>Postgraduate Diploma (PGD) in Statistics, Trinity College Dublin</a:t>
             </a:r>
             <a:endParaRPr lang="en-US" sz="1000" b="1" dirty="0">
               <a:solidFill>
@@ -24387,7 +24410,7 @@
         <p:spPr>
           <a:xfrm>
             <a:off x="5652121" y="992049"/>
-            <a:ext cx="3386836" cy="2292935"/>
+            <a:ext cx="3386836" cy="2462213"/>
           </a:xfrm>
           <a:prstGeom prst="rect">
             <a:avLst/>
@@ -24408,7 +24431,25 @@
                 </a:solidFill>
                 <a:latin typeface="Calibri Light" panose="020F0302020204030204" pitchFamily="34" charset="0"/>
               </a:rPr>
-              <a:t>Solution Architect/Team Lead, Client Solutions Ltd, Dublin</a:t>
+              <a:t>Solution Architect/Team </a:t>
+            </a:r>
+            <a:r>
+              <a:rPr lang="en-GB" sz="1100" b="1" dirty="0" smtClean="0">
+                <a:solidFill>
+                  <a:srgbClr val="464646"/>
+                </a:solidFill>
+                <a:latin typeface="Calibri Light" panose="020F0302020204030204" pitchFamily="34" charset="0"/>
+              </a:rPr>
+              <a:t>Lead/Manager, </a:t>
+            </a:r>
+            <a:r>
+              <a:rPr lang="en-GB" sz="1100" b="1" dirty="0" smtClean="0">
+                <a:solidFill>
+                  <a:srgbClr val="464646"/>
+                </a:solidFill>
+                <a:latin typeface="Calibri Light" panose="020F0302020204030204" pitchFamily="34" charset="0"/>
+              </a:rPr>
+              <a:t>Client Solutions Ltd, Dublin</a:t>
             </a:r>
           </a:p>
           <a:p>
@@ -24423,16 +24464,7 @@
                 </a:solidFill>
                 <a:latin typeface="Calibri Light" panose="020F0302020204030204" pitchFamily="34" charset="0"/>
               </a:rPr>
-              <a:t>Solution/System/Software </a:t>
-            </a:r>
-            <a:r>
-              <a:rPr lang="en-GB" sz="1100" dirty="0" smtClean="0">
-                <a:solidFill>
-                  <a:srgbClr val="464646"/>
-                </a:solidFill>
-                <a:latin typeface="Calibri Light" panose="020F0302020204030204" pitchFamily="34" charset="0"/>
-              </a:rPr>
-              <a:t>Architecture</a:t>
+              <a:t>Solution/System/Software Architecture</a:t>
             </a:r>
           </a:p>
           <a:p>
@@ -24495,16 +24527,7 @@
                 </a:solidFill>
                 <a:latin typeface="Calibri Light" panose="020F0302020204030204" pitchFamily="34" charset="0"/>
               </a:rPr>
-              <a:t> </a:t>
-            </a:r>
-            <a:r>
-              <a:rPr lang="en-GB" sz="1100" dirty="0" smtClean="0">
-                <a:solidFill>
-                  <a:srgbClr val="464646"/>
-                </a:solidFill>
-                <a:latin typeface="Calibri Light" panose="020F0302020204030204" pitchFamily="34" charset="0"/>
-              </a:rPr>
-              <a:t>&amp; Service Oriented Architecture</a:t>
+              <a:t> &amp; Service Oriented Architecture</a:t>
             </a:r>
           </a:p>
           <a:p>
@@ -24585,16 +24608,7 @@
                 </a:solidFill>
                 <a:latin typeface="Calibri Light" panose="020F0302020204030204" pitchFamily="34" charset="0"/>
               </a:rPr>
-              <a:t>Containerization</a:t>
-            </a:r>
-            <a:r>
-              <a:rPr lang="en-GB" sz="1100" dirty="0" smtClean="0">
-                <a:solidFill>
-                  <a:srgbClr val="464646"/>
-                </a:solidFill>
-                <a:latin typeface="Calibri Light" panose="020F0302020204030204" pitchFamily="34" charset="0"/>
-              </a:rPr>
-              <a:t>, DevOps </a:t>
+              <a:t>Containerization, DevOps </a:t>
             </a:r>
             <a:r>
               <a:rPr lang="en-GB" sz="1100" dirty="0">
@@ -24691,47 +24705,12 @@
           </a:fontRef>
         </p:style>
       </p:cxnSp>
-      <p:sp>
-        <p:nvSpPr>
-          <p:cNvPr id="3" name="TextBox 2">
-            <a:extLst>
-              <a:ext uri="{FF2B5EF4-FFF2-40B4-BE49-F238E27FC236}">
-                <a16:creationId xmlns="" xmlns:a16="http://schemas.microsoft.com/office/drawing/2014/main" id="{781DD2B0-EAAC-4443-BB78-DB57DCD9202E}"/>
-              </a:ext>
-            </a:extLst>
-          </p:cNvPr>
-          <p:cNvSpPr txBox="1"/>
-          <p:nvPr/>
-        </p:nvSpPr>
-        <p:spPr>
-          <a:xfrm>
-            <a:off x="423264" y="673352"/>
-            <a:ext cx="834502" cy="1200329"/>
-          </a:xfrm>
-          <a:prstGeom prst="rect">
-            <a:avLst/>
-          </a:prstGeom>
-          <a:noFill/>
-        </p:spPr>
-        <p:txBody>
-          <a:bodyPr wrap="square" rtlCol="0">
-            <a:spAutoFit/>
-          </a:bodyPr>
-          <a:lstStyle/>
-          <a:p>
-            <a:r>
-              <a:rPr lang="en-GB" i="1" dirty="0"/>
-              <a:t>Insert Profile Picture</a:t>
-            </a:r>
-          </a:p>
-        </p:txBody>
-      </p:sp>
       <p:cxnSp>
         <p:nvCxnSpPr>
           <p:cNvPr id="128" name="Straight Arrow Connector 127">
             <a:extLst>
               <a:ext uri="{FF2B5EF4-FFF2-40B4-BE49-F238E27FC236}">
-                <a16:creationId xmlns="" xmlns:a16="http://schemas.microsoft.com/office/drawing/2014/main" id="{91318735-E900-4BA6-BE6D-D882B4119B83}"/>
+                <a16:creationId xmlns:a16="http://schemas.microsoft.com/office/drawing/2014/main" xmlns="" id="{91318735-E900-4BA6-BE6D-D882B4119B83}"/>
               </a:ext>
             </a:extLst>
           </p:cNvPr>
@@ -24742,7 +24721,7 @@
         </p:nvCxnSpPr>
         <p:spPr>
           <a:xfrm>
-            <a:off x="5577995" y="3353387"/>
+            <a:off x="5577995" y="3434072"/>
             <a:ext cx="0" cy="3605"/>
           </a:xfrm>
           <a:prstGeom prst="straightConnector1">
@@ -24775,7 +24754,7 @@
           <p:cNvPr id="207" name="Group 206">
             <a:extLst>
               <a:ext uri="{FF2B5EF4-FFF2-40B4-BE49-F238E27FC236}">
-                <a16:creationId xmlns="" xmlns:a16="http://schemas.microsoft.com/office/drawing/2014/main" id="{39733C15-9AB1-4F96-BDB5-5B6B2E3C0D4B}"/>
+                <a16:creationId xmlns:a16="http://schemas.microsoft.com/office/drawing/2014/main" xmlns="" id="{39733C15-9AB1-4F96-BDB5-5B6B2E3C0D4B}"/>
               </a:ext>
             </a:extLst>
           </p:cNvPr>
@@ -24802,7 +24781,7 @@
             <p:cNvPr id="215" name="Rectangle 5">
               <a:extLst>
                 <a:ext uri="{FF2B5EF4-FFF2-40B4-BE49-F238E27FC236}">
-                  <a16:creationId xmlns="" xmlns:a16="http://schemas.microsoft.com/office/drawing/2014/main" id="{4C16F0A2-9AF2-4909-9AE4-D6A44355B937}"/>
+                  <a16:creationId xmlns:a16="http://schemas.microsoft.com/office/drawing/2014/main" xmlns="" id="{4C16F0A2-9AF2-4909-9AE4-D6A44355B937}"/>
                 </a:ext>
               </a:extLst>
             </p:cNvPr>
@@ -24848,7 +24827,7 @@
             <p:cNvPr id="216" name="Rectangle 6">
               <a:extLst>
                 <a:ext uri="{FF2B5EF4-FFF2-40B4-BE49-F238E27FC236}">
-                  <a16:creationId xmlns="" xmlns:a16="http://schemas.microsoft.com/office/drawing/2014/main" id="{955A6389-414F-4DC3-A27C-D2F355DA5487}"/>
+                  <a16:creationId xmlns:a16="http://schemas.microsoft.com/office/drawing/2014/main" xmlns="" id="{955A6389-414F-4DC3-A27C-D2F355DA5487}"/>
                 </a:ext>
               </a:extLst>
             </p:cNvPr>
@@ -24894,7 +24873,7 @@
             <p:cNvPr id="217" name="Rectangle 7">
               <a:extLst>
                 <a:ext uri="{FF2B5EF4-FFF2-40B4-BE49-F238E27FC236}">
-                  <a16:creationId xmlns="" xmlns:a16="http://schemas.microsoft.com/office/drawing/2014/main" id="{308FC843-0CE4-44D1-86C2-9A3E8F178B44}"/>
+                  <a16:creationId xmlns:a16="http://schemas.microsoft.com/office/drawing/2014/main" xmlns="" id="{308FC843-0CE4-44D1-86C2-9A3E8F178B44}"/>
                 </a:ext>
               </a:extLst>
             </p:cNvPr>
@@ -24940,7 +24919,7 @@
             <p:cNvPr id="218" name="Rectangle 8">
               <a:extLst>
                 <a:ext uri="{FF2B5EF4-FFF2-40B4-BE49-F238E27FC236}">
-                  <a16:creationId xmlns="" xmlns:a16="http://schemas.microsoft.com/office/drawing/2014/main" id="{6626312E-8E83-4E21-8B12-79B8A155A4D1}"/>
+                  <a16:creationId xmlns:a16="http://schemas.microsoft.com/office/drawing/2014/main" xmlns="" id="{6626312E-8E83-4E21-8B12-79B8A155A4D1}"/>
                 </a:ext>
               </a:extLst>
             </p:cNvPr>
@@ -24986,7 +24965,7 @@
             <p:cNvPr id="223" name="Rectangle 9">
               <a:extLst>
                 <a:ext uri="{FF2B5EF4-FFF2-40B4-BE49-F238E27FC236}">
-                  <a16:creationId xmlns="" xmlns:a16="http://schemas.microsoft.com/office/drawing/2014/main" id="{7CE07C91-99AE-4DC6-BED3-223A00A11505}"/>
+                  <a16:creationId xmlns:a16="http://schemas.microsoft.com/office/drawing/2014/main" xmlns="" id="{7CE07C91-99AE-4DC6-BED3-223A00A11505}"/>
                 </a:ext>
               </a:extLst>
             </p:cNvPr>
@@ -25032,7 +25011,7 @@
             <p:cNvPr id="224" name="Rectangle 10">
               <a:extLst>
                 <a:ext uri="{FF2B5EF4-FFF2-40B4-BE49-F238E27FC236}">
-                  <a16:creationId xmlns="" xmlns:a16="http://schemas.microsoft.com/office/drawing/2014/main" id="{A8A0EFBC-824C-40E1-A13B-8CEF900FD084}"/>
+                  <a16:creationId xmlns:a16="http://schemas.microsoft.com/office/drawing/2014/main" xmlns="" id="{A8A0EFBC-824C-40E1-A13B-8CEF900FD084}"/>
                 </a:ext>
               </a:extLst>
             </p:cNvPr>
@@ -25078,7 +25057,7 @@
             <p:cNvPr id="225" name="Rectangle 11">
               <a:extLst>
                 <a:ext uri="{FF2B5EF4-FFF2-40B4-BE49-F238E27FC236}">
-                  <a16:creationId xmlns="" xmlns:a16="http://schemas.microsoft.com/office/drawing/2014/main" id="{F3E07C00-D179-44DC-859D-4A139630FD95}"/>
+                  <a16:creationId xmlns:a16="http://schemas.microsoft.com/office/drawing/2014/main" xmlns="" id="{F3E07C00-D179-44DC-859D-4A139630FD95}"/>
                 </a:ext>
               </a:extLst>
             </p:cNvPr>
@@ -25124,7 +25103,7 @@
             <p:cNvPr id="226" name="Rectangle 12">
               <a:extLst>
                 <a:ext uri="{FF2B5EF4-FFF2-40B4-BE49-F238E27FC236}">
-                  <a16:creationId xmlns="" xmlns:a16="http://schemas.microsoft.com/office/drawing/2014/main" id="{5E25DD05-5BE0-4C77-B7A1-ADFBAADCF1B8}"/>
+                  <a16:creationId xmlns:a16="http://schemas.microsoft.com/office/drawing/2014/main" xmlns="" id="{5E25DD05-5BE0-4C77-B7A1-ADFBAADCF1B8}"/>
                 </a:ext>
               </a:extLst>
             </p:cNvPr>
@@ -25170,7 +25149,7 @@
             <p:cNvPr id="227" name="Rectangle 13">
               <a:extLst>
                 <a:ext uri="{FF2B5EF4-FFF2-40B4-BE49-F238E27FC236}">
-                  <a16:creationId xmlns="" xmlns:a16="http://schemas.microsoft.com/office/drawing/2014/main" id="{37B2F94A-7EF0-4663-9E0C-5F89CBF62A4A}"/>
+                  <a16:creationId xmlns:a16="http://schemas.microsoft.com/office/drawing/2014/main" xmlns="" id="{37B2F94A-7EF0-4663-9E0C-5F89CBF62A4A}"/>
                 </a:ext>
               </a:extLst>
             </p:cNvPr>
@@ -25216,7 +25195,7 @@
             <p:cNvPr id="228" name="Rectangle 14">
               <a:extLst>
                 <a:ext uri="{FF2B5EF4-FFF2-40B4-BE49-F238E27FC236}">
-                  <a16:creationId xmlns="" xmlns:a16="http://schemas.microsoft.com/office/drawing/2014/main" id="{9889D737-7842-48A8-8E38-E4E7B8E42090}"/>
+                  <a16:creationId xmlns:a16="http://schemas.microsoft.com/office/drawing/2014/main" xmlns="" id="{9889D737-7842-48A8-8E38-E4E7B8E42090}"/>
                 </a:ext>
               </a:extLst>
             </p:cNvPr>
@@ -25262,7 +25241,7 @@
             <p:cNvPr id="229" name="Rectangle 15">
               <a:extLst>
                 <a:ext uri="{FF2B5EF4-FFF2-40B4-BE49-F238E27FC236}">
-                  <a16:creationId xmlns="" xmlns:a16="http://schemas.microsoft.com/office/drawing/2014/main" id="{3C6B15DE-CB0D-42DD-A3E2-5D971ECA11DD}"/>
+                  <a16:creationId xmlns:a16="http://schemas.microsoft.com/office/drawing/2014/main" xmlns="" id="{3C6B15DE-CB0D-42DD-A3E2-5D971ECA11DD}"/>
                 </a:ext>
               </a:extLst>
             </p:cNvPr>
@@ -25308,7 +25287,7 @@
             <p:cNvPr id="230" name="Rectangle 16">
               <a:extLst>
                 <a:ext uri="{FF2B5EF4-FFF2-40B4-BE49-F238E27FC236}">
-                  <a16:creationId xmlns="" xmlns:a16="http://schemas.microsoft.com/office/drawing/2014/main" id="{CBB0193E-6069-450B-85C1-09D80452EA72}"/>
+                  <a16:creationId xmlns:a16="http://schemas.microsoft.com/office/drawing/2014/main" xmlns="" id="{CBB0193E-6069-450B-85C1-09D80452EA72}"/>
                 </a:ext>
               </a:extLst>
             </p:cNvPr>
@@ -25358,8 +25337,8 @@
         </p:nvSpPr>
         <p:spPr>
           <a:xfrm>
-            <a:off x="-36513" y="6444044"/>
-            <a:ext cx="1657597" cy="369332"/>
+            <a:off x="46146" y="6444044"/>
+            <a:ext cx="1838197" cy="369332"/>
           </a:xfrm>
           <a:prstGeom prst="rect">
             <a:avLst/>
@@ -25475,7 +25454,40 @@
                 <a:ea typeface="Segoe UI Black" panose="020B0A02040204020203" pitchFamily="34" charset="0"/>
                 <a:cs typeface="Segoe UI Semibold" panose="020B0702040204020203" pitchFamily="34" charset="0"/>
               </a:rPr>
-              <a:t>Team Leadership, Project Management, Cloud</a:t>
+              <a:t>Team </a:t>
+            </a:r>
+            <a:r>
+              <a:rPr lang="en-GB" sz="900" dirty="0" smtClean="0">
+                <a:solidFill>
+                  <a:srgbClr val="FFFFFF"/>
+                </a:solidFill>
+                <a:latin typeface="Segoe UI Semibold" panose="020B0702040204020203" pitchFamily="34" charset="0"/>
+                <a:ea typeface="Segoe UI Black" panose="020B0A02040204020203" pitchFamily="34" charset="0"/>
+                <a:cs typeface="Segoe UI Semibold" panose="020B0702040204020203" pitchFamily="34" charset="0"/>
+              </a:rPr>
+              <a:t>Leadership, </a:t>
+            </a:r>
+            <a:r>
+              <a:rPr lang="en-GB" sz="900" dirty="0" smtClean="0">
+                <a:solidFill>
+                  <a:srgbClr val="FFFFFF"/>
+                </a:solidFill>
+                <a:latin typeface="Segoe UI Semibold" panose="020B0702040204020203" pitchFamily="34" charset="0"/>
+                <a:ea typeface="Segoe UI Black" panose="020B0A02040204020203" pitchFamily="34" charset="0"/>
+                <a:cs typeface="Segoe UI Semibold" panose="020B0702040204020203" pitchFamily="34" charset="0"/>
+              </a:rPr>
+              <a:t>Project </a:t>
+            </a:r>
+            <a:r>
+              <a:rPr lang="en-GB" sz="900" dirty="0" smtClean="0">
+                <a:solidFill>
+                  <a:srgbClr val="FFFFFF"/>
+                </a:solidFill>
+                <a:latin typeface="Segoe UI Semibold" panose="020B0702040204020203" pitchFamily="34" charset="0"/>
+                <a:ea typeface="Segoe UI Black" panose="020B0A02040204020203" pitchFamily="34" charset="0"/>
+                <a:cs typeface="Segoe UI Semibold" panose="020B0702040204020203" pitchFamily="34" charset="0"/>
+              </a:rPr>
+              <a:t>Management (Scrum/Kanban)</a:t>
             </a:r>
             <a:endParaRPr lang="id-ID" sz="900" dirty="0">
               <a:solidFill>
@@ -26348,7 +26360,7 @@
               <a:avLst/>
             </a:prstGeom>
             <a:solidFill>
-              <a:schemeClr val="bg2"/>
+              <a:srgbClr val="34B233"/>
             </a:solidFill>
             <a:ln>
               <a:noFill/>
@@ -26388,7 +26400,7 @@
               <a:avLst/>
             </a:prstGeom>
             <a:solidFill>
-              <a:schemeClr val="bg2"/>
+              <a:srgbClr val="34B233"/>
             </a:solidFill>
             <a:ln>
               <a:noFill/>
@@ -26461,7 +26473,7 @@
           <p:nvPr/>
         </p:nvPicPr>
         <p:blipFill>
-          <a:blip r:embed="rId4" cstate="print">
+          <a:blip r:embed="rId5" cstate="print">
             <a:extLst>
               <a:ext uri="{28A0092B-C50C-407E-A947-70E740481C1C}">
                 <a14:useLocalDpi xmlns:a14="http://schemas.microsoft.com/office/drawing/2010/main" val="0"/>
@@ -26475,8 +26487,8 @@
         </p:blipFill>
         <p:spPr bwMode="auto">
           <a:xfrm>
-            <a:off x="0" y="0"/>
-            <a:ext cx="1257766" cy="1796024"/>
+            <a:off x="113337" y="53582"/>
+            <a:ext cx="1146295" cy="1431202"/>
           </a:xfrm>
           <a:prstGeom prst="rect">
             <a:avLst/>
@@ -26511,7 +26523,7 @@
           <p:cNvPr id="102" name="Straight Arrow Connector 101">
             <a:extLst>
               <a:ext uri="{FF2B5EF4-FFF2-40B4-BE49-F238E27FC236}">
-                <a16:creationId xmlns="" xmlns:a16="http://schemas.microsoft.com/office/drawing/2014/main" id="{91318735-E900-4BA6-BE6D-D882B4119B83}"/>
+                <a16:creationId xmlns:a16="http://schemas.microsoft.com/office/drawing/2014/main" xmlns="" id="{91318735-E900-4BA6-BE6D-D882B4119B83}"/>
               </a:ext>
             </a:extLst>
           </p:cNvPr>
@@ -26558,7 +26570,7 @@
         </p:nvSpPr>
         <p:spPr>
           <a:xfrm>
-            <a:off x="5652122" y="4581128"/>
+            <a:off x="5652122" y="4650521"/>
             <a:ext cx="3369052" cy="938719"/>
           </a:xfrm>
           <a:prstGeom prst="rect">
@@ -26595,16 +26607,7 @@
                 </a:solidFill>
                 <a:latin typeface="Calibri Light" panose="020F0302020204030204" pitchFamily="34" charset="0"/>
               </a:rPr>
-              <a:t>Lead implementation of e-Banking suite (ATM Controller and Middleware</a:t>
-            </a:r>
-            <a:r>
-              <a:rPr lang="en-IE" sz="1100" dirty="0" smtClean="0">
-                <a:solidFill>
-                  <a:srgbClr val="464646"/>
-                </a:solidFill>
-                <a:latin typeface="Calibri Light" panose="020F0302020204030204" pitchFamily="34" charset="0"/>
-              </a:rPr>
-              <a:t>)</a:t>
+              <a:t>Lead implementation of e-Banking suite (ATM Controller and Middleware)</a:t>
             </a:r>
           </a:p>
           <a:p>
@@ -26621,12 +26624,6 @@
               </a:rPr>
               <a:t>Developed ATM Surveillance &amp; Biometric Fingerprint authentication software</a:t>
             </a:r>
-            <a:endParaRPr lang="en-IE" sz="1100" dirty="0" smtClean="0">
-              <a:solidFill>
-                <a:srgbClr val="464646"/>
-              </a:solidFill>
-              <a:latin typeface="Calibri Light" panose="020F0302020204030204" pitchFamily="34" charset="0"/>
-            </a:endParaRPr>
           </a:p>
         </p:txBody>
       </p:sp>
@@ -26638,7 +26635,7 @@
         </p:nvSpPr>
         <p:spPr>
           <a:xfrm>
-            <a:off x="4716016" y="4638328"/>
+            <a:off x="4716016" y="4707721"/>
             <a:ext cx="782587" cy="230832"/>
           </a:xfrm>
           <a:prstGeom prst="rect">
@@ -26731,7 +26728,7 @@
           <p:cNvPr id="99" name="Straight Arrow Connector 98">
             <a:extLst>
               <a:ext uri="{FF2B5EF4-FFF2-40B4-BE49-F238E27FC236}">
-                <a16:creationId xmlns="" xmlns:a16="http://schemas.microsoft.com/office/drawing/2014/main" id="{91318735-E900-4BA6-BE6D-D882B4119B83}"/>
+                <a16:creationId xmlns:a16="http://schemas.microsoft.com/office/drawing/2014/main" xmlns="" id="{91318735-E900-4BA6-BE6D-D882B4119B83}"/>
               </a:ext>
             </a:extLst>
           </p:cNvPr>
@@ -26742,8 +26739,8 @@
         </p:nvCxnSpPr>
         <p:spPr>
           <a:xfrm>
-            <a:off x="5580112" y="4145475"/>
-            <a:ext cx="0" cy="3605"/>
+            <a:off x="5580112" y="4266077"/>
+            <a:ext cx="0" cy="3277"/>
           </a:xfrm>
           <a:prstGeom prst="straightConnector1">
             <a:avLst/>
@@ -26778,7 +26775,7 @@
         </p:nvSpPr>
         <p:spPr>
           <a:xfrm>
-            <a:off x="5674428" y="4052972"/>
+            <a:off x="5674428" y="4142910"/>
             <a:ext cx="3362068" cy="600164"/>
           </a:xfrm>
           <a:prstGeom prst="rect">
@@ -26858,7 +26855,7 @@
         </p:nvSpPr>
         <p:spPr>
           <a:xfrm>
-            <a:off x="4663127" y="4134272"/>
+            <a:off x="4663127" y="4203665"/>
             <a:ext cx="782587" cy="230832"/>
           </a:xfrm>
           <a:prstGeom prst="rect">
@@ -28464,7 +28461,7 @@
   </a:extraClrSchemeLst>
   <a:extLst>
     <a:ext uri="{05A4C25C-085E-4340-85A3-A5531E510DB2}">
-      <thm15:themeFamily xmlns="" xmlns:thm15="http://schemas.microsoft.com/office/thememl/2012/main" name="Presentation5" id="{AEE58954-02D7-4052-B918-E9DEAE38BA87}" vid="{CFB7A800-1315-4D7D-BDF7-DAE7F327DAF6}"/>
+      <thm15:themeFamily xmlns:thm15="http://schemas.microsoft.com/office/thememl/2012/main" xmlns="" name="Presentation5" id="{AEE58954-02D7-4052-B918-E9DEAE38BA87}" vid="{CFB7A800-1315-4D7D-BDF7-DAE7F327DAF6}"/>
     </a:ext>
   </a:extLst>
 </a:theme>

</xml_diff>